<commit_message>
Presentatie af alleen nog screenshots, dus niet af
</commit_message>
<xml_diff>
--- a/Presentation/Presentation.pptx
+++ b/Presentation/Presentation.pptx
@@ -110,6 +110,11 @@
       </a:defRPr>
     </a:lvl9pPr>
   </p:defaultTextStyle>
+  <p:extLst>
+    <p:ext uri="{EFAFB233-063F-42B5-8137-9DF3F51BA10A}">
+      <p15:sldGuideLst xmlns:p15="http://schemas.microsoft.com/office/powerpoint/2012/main"/>
+    </p:ext>
+  </p:extLst>
 </p:presentation>
 </file>
 
@@ -4175,6 +4180,36 @@
           </a:p>
         </p:txBody>
       </p:sp>
+      <p:pic>
+        <p:nvPicPr>
+          <p:cNvPr id="3" name="Picture 2"/>
+          <p:cNvPicPr>
+            <a:picLocks noChangeAspect="1"/>
+          </p:cNvPicPr>
+          <p:nvPr/>
+        </p:nvPicPr>
+        <p:blipFill>
+          <a:blip r:embed="rId2" cstate="print">
+            <a:extLst>
+              <a:ext uri="{28A0092B-C50C-407E-A947-70E740481C1C}">
+                <a14:useLocalDpi xmlns:a14="http://schemas.microsoft.com/office/drawing/2010/main" val="0"/>
+              </a:ext>
+            </a:extLst>
+          </a:blip>
+          <a:stretch>
+            <a:fillRect/>
+          </a:stretch>
+        </p:blipFill>
+        <p:spPr>
+          <a:xfrm>
+            <a:off x="4810125" y="1474998"/>
+            <a:ext cx="2571750" cy="4572000"/>
+          </a:xfrm>
+          <a:prstGeom prst="rect">
+            <a:avLst/>
+          </a:prstGeom>
+        </p:spPr>
+      </p:pic>
     </p:spTree>
     <p:extLst>
       <p:ext uri="{BB962C8B-B14F-4D97-AF65-F5344CB8AC3E}">
@@ -4188,7 +4223,121 @@
   <p:timing>
     <p:tnLst>
       <p:par>
-        <p:cTn id="1" dur="indefinite" restart="never" nodeType="tmRoot"/>
+        <p:cTn id="1" dur="indefinite" restart="never" nodeType="tmRoot">
+          <p:childTnLst>
+            <p:seq concurrent="1" nextAc="seek">
+              <p:cTn id="2" dur="indefinite" nodeType="mainSeq">
+                <p:childTnLst>
+                  <p:par>
+                    <p:cTn id="3" fill="hold">
+                      <p:stCondLst>
+                        <p:cond delay="indefinite"/>
+                      </p:stCondLst>
+                      <p:childTnLst>
+                        <p:par>
+                          <p:cTn id="4" fill="hold">
+                            <p:stCondLst>
+                              <p:cond delay="0"/>
+                            </p:stCondLst>
+                            <p:childTnLst>
+                              <p:par>
+                                <p:cTn id="5" presetID="2" presetClass="entr" presetSubtype="2" fill="hold" nodeType="clickEffect">
+                                  <p:stCondLst>
+                                    <p:cond delay="0"/>
+                                  </p:stCondLst>
+                                  <p:childTnLst>
+                                    <p:set>
+                                      <p:cBhvr>
+                                        <p:cTn id="6" dur="1" fill="hold">
+                                          <p:stCondLst>
+                                            <p:cond delay="0"/>
+                                          </p:stCondLst>
+                                        </p:cTn>
+                                        <p:tgtEl>
+                                          <p:spTgt spid="3"/>
+                                        </p:tgtEl>
+                                        <p:attrNameLst>
+                                          <p:attrName>style.visibility</p:attrName>
+                                        </p:attrNameLst>
+                                      </p:cBhvr>
+                                      <p:to>
+                                        <p:strVal val="visible"/>
+                                      </p:to>
+                                    </p:set>
+                                    <p:anim calcmode="lin" valueType="num">
+                                      <p:cBhvr additive="base">
+                                        <p:cTn id="7" dur="1000" fill="hold"/>
+                                        <p:tgtEl>
+                                          <p:spTgt spid="3"/>
+                                        </p:tgtEl>
+                                        <p:attrNameLst>
+                                          <p:attrName>ppt_x</p:attrName>
+                                        </p:attrNameLst>
+                                      </p:cBhvr>
+                                      <p:tavLst>
+                                        <p:tav tm="0">
+                                          <p:val>
+                                            <p:strVal val="1+#ppt_w/2"/>
+                                          </p:val>
+                                        </p:tav>
+                                        <p:tav tm="100000">
+                                          <p:val>
+                                            <p:strVal val="#ppt_x"/>
+                                          </p:val>
+                                        </p:tav>
+                                      </p:tavLst>
+                                    </p:anim>
+                                    <p:anim calcmode="lin" valueType="num">
+                                      <p:cBhvr additive="base">
+                                        <p:cTn id="8" dur="1000" fill="hold"/>
+                                        <p:tgtEl>
+                                          <p:spTgt spid="3"/>
+                                        </p:tgtEl>
+                                        <p:attrNameLst>
+                                          <p:attrName>ppt_y</p:attrName>
+                                        </p:attrNameLst>
+                                      </p:cBhvr>
+                                      <p:tavLst>
+                                        <p:tav tm="0">
+                                          <p:val>
+                                            <p:strVal val="#ppt_y"/>
+                                          </p:val>
+                                        </p:tav>
+                                        <p:tav tm="100000">
+                                          <p:val>
+                                            <p:strVal val="#ppt_y"/>
+                                          </p:val>
+                                        </p:tav>
+                                      </p:tavLst>
+                                    </p:anim>
+                                  </p:childTnLst>
+                                </p:cTn>
+                              </p:par>
+                            </p:childTnLst>
+                          </p:cTn>
+                        </p:par>
+                      </p:childTnLst>
+                    </p:cTn>
+                  </p:par>
+                </p:childTnLst>
+              </p:cTn>
+              <p:prevCondLst>
+                <p:cond evt="onPrev" delay="0">
+                  <p:tgtEl>
+                    <p:sldTgt/>
+                  </p:tgtEl>
+                </p:cond>
+              </p:prevCondLst>
+              <p:nextCondLst>
+                <p:cond evt="onNext" delay="0">
+                  <p:tgtEl>
+                    <p:sldTgt/>
+                  </p:tgtEl>
+                </p:cond>
+              </p:nextCondLst>
+            </p:seq>
+          </p:childTnLst>
+        </p:cTn>
       </p:par>
     </p:tnLst>
   </p:timing>

</xml_diff>